<commit_message>
Viikkotehtävän kuvausta muokattu syksyn 2024 mukaiseksi
</commit_message>
<xml_diff>
--- a/Viikon 5 tehtavat.pptx
+++ b/Viikon 5 tehtavat.pptx
@@ -11,9 +11,6 @@
     <p:sldId id="265" r:id="rId5"/>
     <p:sldId id="259" r:id="rId6"/>
     <p:sldId id="260" r:id="rId7"/>
-    <p:sldId id="261" r:id="rId8"/>
-    <p:sldId id="262" r:id="rId9"/>
-    <p:sldId id="263" r:id="rId10"/>
   </p:sldIdLst>
   <p:sldSz cx="9144000" cy="6858000" type="screen4x3"/>
   <p:notesSz cx="7102475" cy="10234613"/>
@@ -585,7 +582,7 @@
           <a:p>
             <a:fld id="{B6C09D7C-DB1D-4A6D-B280-3E795513477C}" type="datetimeFigureOut">
               <a:rPr lang="en-US" smtClean="0"/>
-              <a:t>6/7/2023</a:t>
+              <a:t>10/10/2024</a:t>
             </a:fld>
             <a:endParaRPr lang="en-US"/>
           </a:p>
@@ -794,7 +791,7 @@
           <a:p>
             <a:fld id="{B6C09D7C-DB1D-4A6D-B280-3E795513477C}" type="datetimeFigureOut">
               <a:rPr lang="en-US" smtClean="0"/>
-              <a:t>6/7/2023</a:t>
+              <a:t>10/10/2024</a:t>
             </a:fld>
             <a:endParaRPr lang="en-US"/>
           </a:p>
@@ -972,7 +969,7 @@
           <a:p>
             <a:fld id="{B6C09D7C-DB1D-4A6D-B280-3E795513477C}" type="datetimeFigureOut">
               <a:rPr lang="en-US" smtClean="0"/>
-              <a:t>6/7/2023</a:t>
+              <a:t>10/10/2024</a:t>
             </a:fld>
             <a:endParaRPr lang="en-US"/>
           </a:p>
@@ -1174,7 +1171,7 @@
           <a:p>
             <a:fld id="{B6C09D7C-DB1D-4A6D-B280-3E795513477C}" type="datetimeFigureOut">
               <a:rPr lang="en-US" smtClean="0"/>
-              <a:t>6/7/2023</a:t>
+              <a:t>10/10/2024</a:t>
             </a:fld>
             <a:endParaRPr lang="en-US"/>
           </a:p>
@@ -1460,7 +1457,7 @@
           <a:p>
             <a:fld id="{B6C09D7C-DB1D-4A6D-B280-3E795513477C}" type="datetimeFigureOut">
               <a:rPr lang="en-US" smtClean="0"/>
-              <a:t>6/7/2023</a:t>
+              <a:t>10/10/2024</a:t>
             </a:fld>
             <a:endParaRPr lang="en-US"/>
           </a:p>
@@ -1745,7 +1742,7 @@
           <a:p>
             <a:fld id="{B6C09D7C-DB1D-4A6D-B280-3E795513477C}" type="datetimeFigureOut">
               <a:rPr lang="en-US" smtClean="0"/>
-              <a:t>6/7/2023</a:t>
+              <a:t>10/10/2024</a:t>
             </a:fld>
             <a:endParaRPr lang="en-US"/>
           </a:p>
@@ -2164,7 +2161,7 @@
           <a:p>
             <a:fld id="{B6C09D7C-DB1D-4A6D-B280-3E795513477C}" type="datetimeFigureOut">
               <a:rPr lang="en-US" smtClean="0"/>
-              <a:t>6/7/2023</a:t>
+              <a:t>10/10/2024</a:t>
             </a:fld>
             <a:endParaRPr lang="en-US"/>
           </a:p>
@@ -2281,7 +2278,7 @@
           <a:p>
             <a:fld id="{B6C09D7C-DB1D-4A6D-B280-3E795513477C}" type="datetimeFigureOut">
               <a:rPr lang="en-US" smtClean="0"/>
-              <a:t>6/7/2023</a:t>
+              <a:t>10/10/2024</a:t>
             </a:fld>
             <a:endParaRPr lang="en-US"/>
           </a:p>
@@ -2376,7 +2373,7 @@
           <a:p>
             <a:fld id="{B6C09D7C-DB1D-4A6D-B280-3E795513477C}" type="datetimeFigureOut">
               <a:rPr lang="en-US" smtClean="0"/>
-              <a:t>6/7/2023</a:t>
+              <a:t>10/10/2024</a:t>
             </a:fld>
             <a:endParaRPr lang="en-US"/>
           </a:p>
@@ -2651,7 +2648,7 @@
           <a:p>
             <a:fld id="{B6C09D7C-DB1D-4A6D-B280-3E795513477C}" type="datetimeFigureOut">
               <a:rPr lang="en-US" smtClean="0"/>
-              <a:t>6/7/2023</a:t>
+              <a:t>10/10/2024</a:t>
             </a:fld>
             <a:endParaRPr lang="en-US"/>
           </a:p>
@@ -2903,7 +2900,7 @@
           <a:p>
             <a:fld id="{B6C09D7C-DB1D-4A6D-B280-3E795513477C}" type="datetimeFigureOut">
               <a:rPr lang="en-US" smtClean="0"/>
-              <a:t>6/7/2023</a:t>
+              <a:t>10/10/2024</a:t>
             </a:fld>
             <a:endParaRPr lang="en-US"/>
           </a:p>
@@ -3114,7 +3111,7 @@
           <a:p>
             <a:fld id="{B6C09D7C-DB1D-4A6D-B280-3E795513477C}" type="datetimeFigureOut">
               <a:rPr lang="en-US" smtClean="0"/>
-              <a:t>6/7/2023</a:t>
+              <a:t>10/10/2024</a:t>
             </a:fld>
             <a:endParaRPr lang="en-US"/>
           </a:p>
@@ -3878,7 +3875,7 @@
         </p:spPr>
         <p:txBody>
           <a:bodyPr>
-            <a:normAutofit fontScale="70000" lnSpcReduction="20000"/>
+            <a:normAutofit fontScale="85000" lnSpcReduction="10000"/>
           </a:bodyPr>
           <a:lstStyle/>
           <a:p>
@@ -3888,31 +3885,15 @@
             </a:pPr>
             <a:r>
               <a:rPr lang="fi-FI" dirty="0"/>
-              <a:t>Käytetään algoritmin toteutukseen aluksi tehtävässä annettua pytty.log tiedostoa (ylänurkan kuva on piirretty tuon tiedoston datasta). Luetaan tiedoston sisältö muuttujaan </a:t>
+              <a:t>Algoritmin testausta varten kannattaa tehdä oma testidata </a:t>
             </a:r>
             <a:r>
               <a:rPr lang="fi-FI" dirty="0" err="1"/>
-              <a:t>esim</a:t>
-            </a:r>
-            <a:r>
-              <a:rPr lang="fi-FI" dirty="0"/>
-              <a:t> </a:t>
-            </a:r>
-            <a:r>
-              <a:rPr lang="fi-FI" dirty="0" err="1"/>
-              <a:t>np.loadtxt</a:t>
-            </a:r>
-            <a:r>
-              <a:rPr lang="fi-FI" dirty="0"/>
-              <a:t> komennon avulla. Tiedostossa on 10 kpl </a:t>
-            </a:r>
-            <a:r>
-              <a:rPr lang="fi-FI" dirty="0" err="1"/>
-              <a:t>x,y,z</a:t>
-            </a:r>
-            <a:r>
-              <a:rPr lang="fi-FI" dirty="0"/>
-              <a:t> mittauksia neljästä eri suunnasta joten yhteensä tiedostosta pitäisi löytyä 40 mittaustulosta.</a:t>
+              <a:t>numPy</a:t>
+            </a:r>
+            <a:r>
+              <a:rPr lang="fi-FI" dirty="0"/>
+              <a:t> taulukkona. Kiihtyvyysanturin lukemat ovat tyypillisesti n. 1800 (akselin suunta maata kohden), 1200(akselin suunta ylöspäin), 1500 (akseliin ei vaikuta maan vetovoima). Tee siis testidata, jossa näkyy 6 suuntaa (3 akselia ja kaikki vuorollaan maan vetovoiman vaikutuspiirissä).</a:t>
             </a:r>
           </a:p>
           <a:p>
@@ -3946,7 +3927,7 @@
             </a:r>
             <a:r>
               <a:rPr lang="fi-FI" dirty="0"/>
-              <a:t> algoritmin vaiheita kuvaavaan selostukseen. Tämä on siis ensimmäinen vaihe, jossa näytetään minkälainen datasetti on ennen datan luokittelua 4:ään eri ”kasaan”.</a:t>
+              <a:t> algoritmin vaiheita kuvaavaan selostukseen. Tämä on siis ensimmäinen vaihe, jossa näytetään minkälainen datasetti on ennen datan luokittelua 6:ään eri ”kasaan”.</a:t>
             </a:r>
           </a:p>
           <a:p>
@@ -3956,25 +3937,7 @@
             </a:pPr>
             <a:r>
               <a:rPr lang="fi-FI" dirty="0"/>
-              <a:t>HUOM1: Sinun tulee lopulta </a:t>
-            </a:r>
-            <a:r>
-              <a:rPr lang="fi-FI" dirty="0" err="1"/>
-              <a:t>toteutta</a:t>
-            </a:r>
-            <a:r>
-              <a:rPr lang="fi-FI" dirty="0"/>
-              <a:t> opetusalgoritmi 6-Means eli luokittelija, joka luokittelee mittausdatan 6 eri luokkaan. Eli jos ja toivottavasti kun, varmistat opetusalgoritmisi toiminnan ensin tuolla putty.log tunnetulla datalla, jossa on VAIN 4 suuntaa, niin tee koodistasi sellainen, että opetusalgoritmi on helposti muutettavissa luokittelemaan 4:stä 6:een luokkaan.</a:t>
-            </a:r>
-          </a:p>
-          <a:p>
-            <a:pPr marL="457200" indent="-457200">
-              <a:buFont typeface="+mj-lt"/>
-              <a:buAutoNum type="arabicPeriod"/>
-            </a:pPr>
-            <a:r>
-              <a:rPr lang="fi-FI" dirty="0"/>
-              <a:t>HUOM2: Kannattaa varmaan lähteä </a:t>
+              <a:t>Kannattaa lähteä </a:t>
             </a:r>
             <a:r>
               <a:rPr lang="fi-FI" dirty="0" err="1"/>
@@ -3990,13 +3953,8 @@
             </a:r>
             <a:r>
               <a:rPr lang="fi-FI" dirty="0"/>
-              <a:t> x2,y2,z2 etäisyyden. Ja sen jälkeen kannattaa miettiä minkälaisessa taulukossa pidetään tallessa step1:n voittajat, joista stepissä 2 lasketaan </a:t>
-            </a:r>
-            <a:r>
-              <a:rPr lang="fi-FI"/>
-              <a:t>uudet keskipisteet.</a:t>
-            </a:r>
-            <a:endParaRPr lang="fi-FI" dirty="0"/>
+              <a:t> x2,y2,z2 etäisyyden. Ja sen jälkeen kannattaa miettiä minkälaisessa taulukossa pidetään tallessa step1:n voittajat, joista stepissä 2 lasketaan uudet keskipisteet.</a:t>
+            </a:r>
           </a:p>
         </p:txBody>
       </p:sp>
@@ -4167,7 +4125,7 @@
         <p:spPr/>
         <p:txBody>
           <a:bodyPr>
-            <a:normAutofit fontScale="85000" lnSpcReduction="20000"/>
+            <a:normAutofit fontScale="85000" lnSpcReduction="10000"/>
           </a:bodyPr>
           <a:lstStyle/>
           <a:p>
@@ -4231,7 +4189,7 @@
             </a:pPr>
             <a:r>
               <a:rPr lang="fi-FI" dirty="0"/>
-              <a:t>Keskipisteet, joita on 4 kpl ja kullakin keskipisteellä on </a:t>
+              <a:t>Keskipisteet, joita on 6 kpl ja kullakin keskipisteellä on </a:t>
             </a:r>
             <a:r>
               <a:rPr lang="fi-FI" dirty="0" err="1"/>
@@ -4247,7 +4205,7 @@
             </a:r>
             <a:r>
               <a:rPr lang="fi-FI" dirty="0"/>
-              <a:t> 4 riviä, 3 saraketta käsittävässä </a:t>
+              <a:t> 6 riviä, 3 saraketta käsittävässä </a:t>
             </a:r>
             <a:r>
               <a:rPr lang="fi-FI" dirty="0" err="1"/>
@@ -4265,7 +4223,7 @@
             </a:pPr>
             <a:r>
               <a:rPr lang="fi-FI" dirty="0"/>
-              <a:t>Arvotaan nämä 4 keskipistettä </a:t>
+              <a:t>Arvotaan nämä 6 keskipistettä </a:t>
             </a:r>
             <a:r>
               <a:rPr lang="fi-FI" dirty="0" err="1"/>
@@ -4313,7 +4271,7 @@
             </a:r>
             <a:r>
               <a:rPr lang="fi-FI" dirty="0"/>
-              <a:t> tulee olla keskipisteiden tapaan 4 riviä, 3 saraketta kokoinen </a:t>
+              <a:t> tulee olla keskipisteiden tapaan 6 riviä, 3 saraketta kokoinen </a:t>
             </a:r>
             <a:r>
               <a:rPr lang="fi-FI" dirty="0" err="1"/>
@@ -4343,7 +4301,7 @@
             </a:r>
             <a:r>
               <a:rPr lang="fi-FI" dirty="0"/>
-              <a:t> tulee olla 1 riviä 4 saraketta kokoinen </a:t>
+              <a:t> tulee olla 1 riviä 6 saraketta kokoinen </a:t>
             </a:r>
             <a:r>
               <a:rPr lang="fi-FI" dirty="0" err="1"/>
@@ -4365,7 +4323,7 @@
             </a:r>
             <a:r>
               <a:rPr lang="fi-FI" dirty="0"/>
-              <a:t> on myös 1 riviä 4 saraketta kokoinen </a:t>
+              <a:t> on myös 1 riviä 6 saraketta kokoinen </a:t>
             </a:r>
             <a:r>
               <a:rPr lang="fi-FI" dirty="0" err="1"/>
@@ -4381,26 +4339,7 @@
             </a:r>
             <a:r>
               <a:rPr lang="fi-FI" dirty="0"/>
-              <a:t> pisteen etäisyys kaikkiin keskipisteet datarakenteessa oleviin 4 keskipisteeseen ja nuo 4 etäisyysarvoa talletetaan tähän muuttujaan.</a:t>
-            </a:r>
-          </a:p>
-          <a:p>
-            <a:pPr marL="857250" lvl="1" indent="-457200">
-              <a:buFont typeface="+mj-lt"/>
-              <a:buAutoNum type="arabicPeriod"/>
-            </a:pPr>
-            <a:r>
-              <a:rPr lang="fi-FI" dirty="0"/>
-              <a:t>Näillä datarakenteilla pärjätään. Piirretään data rakenteista kuvat ja dokumentoidaan kunkin muuttujan tarkoitus algoritmissa kommentoimalla muuttujat.</a:t>
-            </a:r>
-          </a:p>
-          <a:p>
-            <a:pPr marL="800100" lvl="2" indent="0">
-              <a:buNone/>
-            </a:pPr>
-            <a:r>
-              <a:rPr lang="fi-FI" dirty="0"/>
-              <a:t> </a:t>
+              <a:t> pisteen etäisyys kaikkiin keskipisteet datarakenteessa oleviin 6 keskipisteeseen ja nuo 6 etäisyysarvoa talletetaan tähän muuttujaan.</a:t>
             </a:r>
           </a:p>
           <a:p>
@@ -4559,7 +4498,7 @@
             </a:r>
             <a:r>
               <a:rPr lang="fi-FI" dirty="0"/>
-              <a:t> kertaa eli käsittelee kaikki tiedostosta löytynee datapisteet. Joka luupin kierroksella lasketaan sisäkkäisen luupin avulla tämän kyseisen datapisteen etäisyydet ja selvitetään tämän jälkeen minkä keskipisteen etäisyys oli pienin. Ja tuon pienimmän etäisyyden keskipisteen </a:t>
+              <a:t> kertaa eli käsittelee kaikki tietokannasta löytynee datapisteet. Joka kierroksella lasketaan sisäkkäisen luupin avulla tämän kyseisen datapisteen etäisyydet ja selvitetään tämän jälkeen minkä keskipisteen etäisyys oli pienin. Ja tuon pienimmän etäisyyden keskipisteen </a:t>
             </a:r>
             <a:r>
               <a:rPr lang="fi-FI" dirty="0" err="1"/>
@@ -4601,7 +4540,7 @@
             </a:pPr>
             <a:r>
               <a:rPr lang="fi-FI" dirty="0"/>
-              <a:t>Sisäkkäinen luuppi laskee yhden datapisteen etäisyyden kaikkiin 4 keskipisteeseen ja tallentaa tuloksen </a:t>
+              <a:t>Sisäkkäinen luuppi laskee yhden datapisteen etäisyyden kaikkiin 6 keskipisteeseen ja tallentaa tuloksen </a:t>
             </a:r>
             <a:r>
               <a:rPr lang="fi-FI" dirty="0" err="1"/>
@@ -4654,563 +4593,6 @@
     <p:extLst>
       <p:ext uri="{BB962C8B-B14F-4D97-AF65-F5344CB8AC3E}">
         <p14:creationId xmlns:p14="http://schemas.microsoft.com/office/powerpoint/2010/main" val="106145735"/>
-      </p:ext>
-    </p:extLst>
-  </p:cSld>
-  <p:clrMapOvr>
-    <a:masterClrMapping/>
-  </p:clrMapOvr>
-</p:sld>
-</file>
-
-<file path=ppt/slides/slide7.xml><?xml version="1.0" encoding="utf-8"?>
-<p:sld xmlns:a="http://schemas.openxmlformats.org/drawingml/2006/main" xmlns:r="http://schemas.openxmlformats.org/officeDocument/2006/relationships" xmlns:p="http://schemas.openxmlformats.org/presentationml/2006/main">
-  <p:cSld>
-    <p:spTree>
-      <p:nvGrpSpPr>
-        <p:cNvPr id="1" name=""/>
-        <p:cNvGrpSpPr/>
-        <p:nvPr/>
-      </p:nvGrpSpPr>
-      <p:grpSpPr>
-        <a:xfrm>
-          <a:off x="0" y="0"/>
-          <a:ext cx="0" cy="0"/>
-          <a:chOff x="0" y="0"/>
-          <a:chExt cx="0" cy="0"/>
-        </a:xfrm>
-      </p:grpSpPr>
-      <p:sp>
-        <p:nvSpPr>
-          <p:cNvPr id="2" name="Title 1">
-            <a:extLst>
-              <a:ext uri="{FF2B5EF4-FFF2-40B4-BE49-F238E27FC236}">
-                <a16:creationId xmlns:a16="http://schemas.microsoft.com/office/drawing/2014/main" id="{226E3DD2-90AD-9B43-1495-3CFEBC62B8FA}"/>
-              </a:ext>
-            </a:extLst>
-          </p:cNvPr>
-          <p:cNvSpPr>
-            <a:spLocks noGrp="1"/>
-          </p:cNvSpPr>
-          <p:nvPr>
-            <p:ph type="title"/>
-          </p:nvPr>
-        </p:nvSpPr>
-        <p:spPr/>
-        <p:txBody>
-          <a:bodyPr/>
-          <a:lstStyle/>
-          <a:p>
-            <a:r>
-              <a:rPr lang="fi-FI" dirty="0"/>
-              <a:t>Algoritmin vaiheittainen toteutus jatkuu</a:t>
-            </a:r>
-          </a:p>
-        </p:txBody>
-      </p:sp>
-      <p:sp>
-        <p:nvSpPr>
-          <p:cNvPr id="3" name="Content Placeholder 2">
-            <a:extLst>
-              <a:ext uri="{FF2B5EF4-FFF2-40B4-BE49-F238E27FC236}">
-                <a16:creationId xmlns:a16="http://schemas.microsoft.com/office/drawing/2014/main" id="{0D128F02-3578-C8EA-1258-07911EC541BF}"/>
-              </a:ext>
-            </a:extLst>
-          </p:cNvPr>
-          <p:cNvSpPr>
-            <a:spLocks noGrp="1"/>
-          </p:cNvSpPr>
-          <p:nvPr>
-            <p:ph idx="1"/>
-          </p:nvPr>
-        </p:nvSpPr>
-        <p:spPr/>
-        <p:txBody>
-          <a:bodyPr>
-            <a:normAutofit fontScale="77500" lnSpcReduction="20000"/>
-          </a:bodyPr>
-          <a:lstStyle/>
-          <a:p>
-            <a:pPr marL="457200" indent="-457200">
-              <a:buFont typeface="+mj-lt"/>
-              <a:buAutoNum type="arabicPeriod"/>
-            </a:pPr>
-            <a:r>
-              <a:rPr lang="fi-FI" dirty="0"/>
-              <a:t>Tähän asti on siis saatu aikaan toiminnallisuus, missä algoritmin koodi:</a:t>
-            </a:r>
-          </a:p>
-          <a:p>
-            <a:pPr marL="857250" lvl="1" indent="-457200">
-              <a:buFont typeface="+mj-lt"/>
-              <a:buAutoNum type="arabicPeriod"/>
-            </a:pPr>
-            <a:r>
-              <a:rPr lang="fi-FI" dirty="0"/>
-              <a:t>Hakee tiedot putty.log tiedostosta</a:t>
-            </a:r>
-          </a:p>
-          <a:p>
-            <a:pPr marL="857250" lvl="1" indent="-457200">
-              <a:buFont typeface="+mj-lt"/>
-              <a:buAutoNum type="arabicPeriod"/>
-            </a:pPr>
-            <a:r>
-              <a:rPr lang="fi-FI" dirty="0"/>
-              <a:t>Määrittelee 4 satunnaista keskipistettä putty.log tiedoston datan mukaan skaalattuna.</a:t>
-            </a:r>
-          </a:p>
-          <a:p>
-            <a:pPr marL="857250" lvl="1" indent="-457200">
-              <a:buFont typeface="+mj-lt"/>
-              <a:buAutoNum type="arabicPeriod"/>
-            </a:pPr>
-            <a:r>
-              <a:rPr lang="fi-FI" dirty="0"/>
-              <a:t>Data käsitellään yhden kerran kahdessa for luupissa siten, että noiden toistorakenteiden jälkeen </a:t>
-            </a:r>
-            <a:r>
-              <a:rPr lang="fi-FI" dirty="0" err="1"/>
-              <a:t>Counts</a:t>
-            </a:r>
-            <a:r>
-              <a:rPr lang="fi-FI" dirty="0"/>
-              <a:t> muuttujassa on kullekin keskipisteelle tuon keskipisteen voittojen lukumäärä. Ja </a:t>
-            </a:r>
-            <a:r>
-              <a:rPr lang="fi-FI" dirty="0" err="1"/>
-              <a:t>centerPointCumulativeSum</a:t>
-            </a:r>
-            <a:r>
-              <a:rPr lang="fi-FI" dirty="0"/>
-              <a:t> muuttujasta löytyy kullekin 4:lle keskipisteelle </a:t>
-            </a:r>
-            <a:r>
-              <a:rPr lang="fi-FI" dirty="0" err="1"/>
-              <a:t>x,y,z</a:t>
-            </a:r>
-            <a:r>
-              <a:rPr lang="fi-FI" dirty="0"/>
-              <a:t> komponenttien kumulatiivinen summa</a:t>
-            </a:r>
-          </a:p>
-          <a:p>
-            <a:pPr marL="457200" indent="-457200">
-              <a:buFont typeface="+mj-lt"/>
-              <a:buAutoNum type="arabicPeriod"/>
-            </a:pPr>
-            <a:r>
-              <a:rPr lang="fi-FI" dirty="0"/>
-              <a:t>Seuraavaksi </a:t>
-            </a:r>
-            <a:r>
-              <a:rPr lang="fi-FI" dirty="0" err="1"/>
-              <a:t>centerPointCumulativeSum</a:t>
-            </a:r>
-            <a:r>
-              <a:rPr lang="fi-FI" dirty="0"/>
-              <a:t> ja </a:t>
-            </a:r>
-            <a:r>
-              <a:rPr lang="fi-FI" dirty="0" err="1"/>
-              <a:t>count</a:t>
-            </a:r>
-            <a:r>
-              <a:rPr lang="fi-FI" dirty="0"/>
-              <a:t> muuttujan avulla pitää laskea uudet keskipisteet. Huomaa jos joku keskipiste ei saanut yhtään ”voittoa” edellisessä vaiheessa, niin tälle keskipisteelle arvotaan uusi lähtöarvo.</a:t>
-            </a:r>
-          </a:p>
-          <a:p>
-            <a:pPr marL="457200" indent="-457200">
-              <a:buFont typeface="+mj-lt"/>
-              <a:buAutoNum type="arabicPeriod"/>
-            </a:pPr>
-            <a:r>
-              <a:rPr lang="fi-FI" dirty="0"/>
-              <a:t>Toteuta algoritmiin vielä yksi ulompi luuppirakenne, joka tekee tämän kalvon vaiheet 1 ja 2 </a:t>
-            </a:r>
-            <a:r>
-              <a:rPr lang="fi-FI" dirty="0" err="1"/>
-              <a:t>esim</a:t>
-            </a:r>
-            <a:r>
-              <a:rPr lang="fi-FI" dirty="0"/>
-              <a:t> 10 kertaa.</a:t>
-            </a:r>
-          </a:p>
-          <a:p>
-            <a:pPr marL="457200" indent="-457200">
-              <a:buFont typeface="+mj-lt"/>
-              <a:buAutoNum type="arabicPeriod"/>
-            </a:pPr>
-            <a:r>
-              <a:rPr lang="fi-FI" dirty="0"/>
-              <a:t>Toteuta edellisen kohdan luuppirakenteen sisälle jonkinlainen datarakenne, johon keräät keskipisteiden arvot jokaiselta iteraatiokerralta.</a:t>
-            </a:r>
-          </a:p>
-          <a:p>
-            <a:pPr marL="457200" indent="-457200">
-              <a:buFont typeface="+mj-lt"/>
-              <a:buAutoNum type="arabicPeriod"/>
-            </a:pPr>
-            <a:r>
-              <a:rPr lang="fi-FI" dirty="0"/>
-              <a:t>Visualisoi algoritmin suppeneminen kohti oikeita keskipisteitä </a:t>
-            </a:r>
-            <a:r>
-              <a:rPr lang="fi-FI" dirty="0" err="1"/>
-              <a:t>plottaamalla</a:t>
-            </a:r>
-            <a:r>
-              <a:rPr lang="fi-FI" dirty="0"/>
-              <a:t> tai tulostamalla edellisessä vaiheessa keräämäsi keskipisteiden arvot.</a:t>
-            </a:r>
-          </a:p>
-          <a:p>
-            <a:pPr marL="457200" indent="-457200">
-              <a:buFont typeface="+mj-lt"/>
-              <a:buAutoNum type="arabicPeriod"/>
-            </a:pPr>
-            <a:r>
-              <a:rPr lang="fi-FI" dirty="0"/>
-              <a:t>Testaa algoritmia. Algoritmin pitäisi aina päätyä tilanteeseen, missä kullekin keskipisteelle tulee 10 data pistettä. Kun algoritmi toimii varmasti, vie syntynyt koodi </a:t>
-            </a:r>
-            <a:r>
-              <a:rPr lang="fi-FI" dirty="0" err="1"/>
-              <a:t>githubiin</a:t>
-            </a:r>
-            <a:r>
-              <a:rPr lang="fi-FI" dirty="0"/>
-              <a:t> ja viimeistele </a:t>
-            </a:r>
-            <a:r>
-              <a:rPr lang="fi-FI" dirty="0" err="1"/>
-              <a:t>readme</a:t>
-            </a:r>
-            <a:r>
-              <a:rPr lang="fi-FI" dirty="0"/>
-              <a:t> dokumentin K-</a:t>
-            </a:r>
-            <a:r>
-              <a:rPr lang="fi-FI" dirty="0" err="1"/>
-              <a:t>means</a:t>
-            </a:r>
-            <a:r>
-              <a:rPr lang="fi-FI" dirty="0"/>
-              <a:t> algoritmikuvaus.</a:t>
-            </a:r>
-          </a:p>
-        </p:txBody>
-      </p:sp>
-    </p:spTree>
-    <p:extLst>
-      <p:ext uri="{BB962C8B-B14F-4D97-AF65-F5344CB8AC3E}">
-        <p14:creationId xmlns:p14="http://schemas.microsoft.com/office/powerpoint/2010/main" val="3541121176"/>
-      </p:ext>
-    </p:extLst>
-  </p:cSld>
-  <p:clrMapOvr>
-    <a:masterClrMapping/>
-  </p:clrMapOvr>
-</p:sld>
-</file>
-
-<file path=ppt/slides/slide8.xml><?xml version="1.0" encoding="utf-8"?>
-<p:sld xmlns:a="http://schemas.openxmlformats.org/drawingml/2006/main" xmlns:r="http://schemas.openxmlformats.org/officeDocument/2006/relationships" xmlns:p="http://schemas.openxmlformats.org/presentationml/2006/main">
-  <p:cSld>
-    <p:spTree>
-      <p:nvGrpSpPr>
-        <p:cNvPr id="1" name=""/>
-        <p:cNvGrpSpPr/>
-        <p:nvPr/>
-      </p:nvGrpSpPr>
-      <p:grpSpPr>
-        <a:xfrm>
-          <a:off x="0" y="0"/>
-          <a:ext cx="0" cy="0"/>
-          <a:chOff x="0" y="0"/>
-          <a:chExt cx="0" cy="0"/>
-        </a:xfrm>
-      </p:grpSpPr>
-      <p:sp>
-        <p:nvSpPr>
-          <p:cNvPr id="2" name="Title 1">
-            <a:extLst>
-              <a:ext uri="{FF2B5EF4-FFF2-40B4-BE49-F238E27FC236}">
-                <a16:creationId xmlns:a16="http://schemas.microsoft.com/office/drawing/2014/main" id="{C958F98B-BDB9-2499-6750-5EFA7B3DFCAA}"/>
-              </a:ext>
-            </a:extLst>
-          </p:cNvPr>
-          <p:cNvSpPr>
-            <a:spLocks noGrp="1"/>
-          </p:cNvSpPr>
-          <p:nvPr>
-            <p:ph type="title"/>
-          </p:nvPr>
-        </p:nvSpPr>
-        <p:spPr/>
-        <p:txBody>
-          <a:bodyPr/>
-          <a:lstStyle/>
-          <a:p>
-            <a:r>
-              <a:rPr lang="fi-FI" dirty="0"/>
-              <a:t>K-</a:t>
-            </a:r>
-            <a:r>
-              <a:rPr lang="fi-FI" dirty="0" err="1"/>
-              <a:t>means</a:t>
-            </a:r>
-            <a:r>
-              <a:rPr lang="fi-FI" dirty="0"/>
-              <a:t> algoritmin opetus omalla datalla</a:t>
-            </a:r>
-          </a:p>
-        </p:txBody>
-      </p:sp>
-      <p:sp>
-        <p:nvSpPr>
-          <p:cNvPr id="3" name="Content Placeholder 2">
-            <a:extLst>
-              <a:ext uri="{FF2B5EF4-FFF2-40B4-BE49-F238E27FC236}">
-                <a16:creationId xmlns:a16="http://schemas.microsoft.com/office/drawing/2014/main" id="{6AA82FFD-1775-E856-3678-A687CF51D4C4}"/>
-              </a:ext>
-            </a:extLst>
-          </p:cNvPr>
-          <p:cNvSpPr>
-            <a:spLocks noGrp="1"/>
-          </p:cNvSpPr>
-          <p:nvPr>
-            <p:ph idx="1"/>
-          </p:nvPr>
-        </p:nvSpPr>
-        <p:spPr/>
-        <p:txBody>
-          <a:bodyPr/>
-          <a:lstStyle/>
-          <a:p>
-            <a:pPr marL="457200" indent="-457200">
-              <a:buFont typeface="+mj-lt"/>
-              <a:buAutoNum type="arabicPeriod"/>
-            </a:pPr>
-            <a:r>
-              <a:rPr lang="fi-FI" dirty="0"/>
-              <a:t>Lue mittaamasi kiihtyvyysanturidata tietokannasta ja muokkaa data siihen muotoon, minkä edellä tehty algoritmi vaatii.</a:t>
-            </a:r>
-          </a:p>
-          <a:p>
-            <a:pPr marL="457200" indent="-457200">
-              <a:buFont typeface="+mj-lt"/>
-              <a:buAutoNum type="arabicPeriod"/>
-            </a:pPr>
-            <a:r>
-              <a:rPr lang="fi-FI" dirty="0"/>
-              <a:t>Opeta algoritmia, kunnes keskipisteiden välillä ei tapahdu enää uusien opetuskertojen jälkeen muutoksia (</a:t>
-            </a:r>
-            <a:r>
-              <a:rPr lang="fi-FI" dirty="0" err="1"/>
-              <a:t>esim</a:t>
-            </a:r>
-            <a:r>
-              <a:rPr lang="fi-FI" dirty="0"/>
-              <a:t> se </a:t>
-            </a:r>
-            <a:r>
-              <a:rPr lang="fi-FI" dirty="0" err="1"/>
-              <a:t>count</a:t>
-            </a:r>
-            <a:r>
-              <a:rPr lang="fi-FI" dirty="0"/>
-              <a:t> arvo kullekin keskipisteelle pysyy samana opetuskerrasta toiseen).</a:t>
-            </a:r>
-          </a:p>
-          <a:p>
-            <a:pPr marL="457200" indent="-457200">
-              <a:buFont typeface="+mj-lt"/>
-              <a:buAutoNum type="arabicPeriod"/>
-            </a:pPr>
-            <a:r>
-              <a:rPr lang="fi-FI" dirty="0"/>
-              <a:t>Talleta opetetut keskipisteen myöhempää Arduino toteutusta varten. Vie algoritmin koodi ja talletetut keskipisteet tieto </a:t>
-            </a:r>
-            <a:r>
-              <a:rPr lang="fi-FI" dirty="0" err="1"/>
-              <a:t>githubiin</a:t>
-            </a:r>
-            <a:r>
-              <a:rPr lang="fi-FI" dirty="0"/>
-              <a:t> talteen.</a:t>
-            </a:r>
-          </a:p>
-        </p:txBody>
-      </p:sp>
-    </p:spTree>
-    <p:extLst>
-      <p:ext uri="{BB962C8B-B14F-4D97-AF65-F5344CB8AC3E}">
-        <p14:creationId xmlns:p14="http://schemas.microsoft.com/office/powerpoint/2010/main" val="4159999493"/>
-      </p:ext>
-    </p:extLst>
-  </p:cSld>
-  <p:clrMapOvr>
-    <a:masterClrMapping/>
-  </p:clrMapOvr>
-</p:sld>
-</file>
-
-<file path=ppt/slides/slide9.xml><?xml version="1.0" encoding="utf-8"?>
-<p:sld xmlns:a="http://schemas.openxmlformats.org/drawingml/2006/main" xmlns:r="http://schemas.openxmlformats.org/officeDocument/2006/relationships" xmlns:p="http://schemas.openxmlformats.org/presentationml/2006/main">
-  <p:cSld>
-    <p:spTree>
-      <p:nvGrpSpPr>
-        <p:cNvPr id="1" name=""/>
-        <p:cNvGrpSpPr/>
-        <p:nvPr/>
-      </p:nvGrpSpPr>
-      <p:grpSpPr>
-        <a:xfrm>
-          <a:off x="0" y="0"/>
-          <a:ext cx="0" cy="0"/>
-          <a:chOff x="0" y="0"/>
-          <a:chExt cx="0" cy="0"/>
-        </a:xfrm>
-      </p:grpSpPr>
-      <p:sp>
-        <p:nvSpPr>
-          <p:cNvPr id="2" name="Title 1">
-            <a:extLst>
-              <a:ext uri="{FF2B5EF4-FFF2-40B4-BE49-F238E27FC236}">
-                <a16:creationId xmlns:a16="http://schemas.microsoft.com/office/drawing/2014/main" id="{E1BA536A-9662-47E2-4624-8553CB6631FC}"/>
-              </a:ext>
-            </a:extLst>
-          </p:cNvPr>
-          <p:cNvSpPr>
-            <a:spLocks noGrp="1"/>
-          </p:cNvSpPr>
-          <p:nvPr>
-            <p:ph type="title"/>
-          </p:nvPr>
-        </p:nvSpPr>
-        <p:spPr/>
-        <p:txBody>
-          <a:bodyPr/>
-          <a:lstStyle/>
-          <a:p>
-            <a:r>
-              <a:rPr lang="fi-FI" dirty="0"/>
-              <a:t>Ylimääräisiä tehtäviä</a:t>
-            </a:r>
-          </a:p>
-        </p:txBody>
-      </p:sp>
-      <p:sp>
-        <p:nvSpPr>
-          <p:cNvPr id="3" name="Content Placeholder 2">
-            <a:extLst>
-              <a:ext uri="{FF2B5EF4-FFF2-40B4-BE49-F238E27FC236}">
-                <a16:creationId xmlns:a16="http://schemas.microsoft.com/office/drawing/2014/main" id="{DD6E52F9-82D9-F005-D466-82DF096BDC7A}"/>
-              </a:ext>
-            </a:extLst>
-          </p:cNvPr>
-          <p:cNvSpPr>
-            <a:spLocks noGrp="1"/>
-          </p:cNvSpPr>
-          <p:nvPr>
-            <p:ph idx="1"/>
-          </p:nvPr>
-        </p:nvSpPr>
-        <p:spPr/>
-        <p:txBody>
-          <a:bodyPr>
-            <a:normAutofit lnSpcReduction="10000"/>
-          </a:bodyPr>
-          <a:lstStyle/>
-          <a:p>
-            <a:pPr marL="457200" indent="-457200">
-              <a:buFont typeface="+mj-lt"/>
-              <a:buAutoNum type="arabicPeriod"/>
-            </a:pPr>
-            <a:r>
-              <a:rPr lang="fi-FI" dirty="0"/>
-              <a:t>Käytä koneoppimisen kurssin kotitehtävän 5 dataout.csv tiedostoa tai omaa mitattua dataa neuroverkon opettamiseen. Neuroverkon </a:t>
-            </a:r>
-            <a:r>
-              <a:rPr lang="fi-FI" dirty="0" err="1"/>
-              <a:t>input_shape</a:t>
-            </a:r>
-            <a:r>
-              <a:rPr lang="fi-FI" dirty="0"/>
-              <a:t> = 3 eli neuroverkolle annetaan </a:t>
-            </a:r>
-            <a:r>
-              <a:rPr lang="fi-FI" dirty="0" err="1"/>
-              <a:t>x,y,z</a:t>
-            </a:r>
-            <a:r>
-              <a:rPr lang="fi-FI" dirty="0"/>
-              <a:t> kiihtyvyysanturiarvot ja output </a:t>
-            </a:r>
-            <a:r>
-              <a:rPr lang="fi-FI" dirty="0" err="1"/>
-              <a:t>layerillä</a:t>
-            </a:r>
-            <a:r>
-              <a:rPr lang="fi-FI" dirty="0"/>
-              <a:t> on 4 luokkaa eli </a:t>
-            </a:r>
-            <a:r>
-              <a:rPr lang="fi-FI" dirty="0" err="1"/>
-              <a:t>num_classes</a:t>
-            </a:r>
-            <a:r>
-              <a:rPr lang="fi-FI" dirty="0"/>
-              <a:t> = 4. Toteuta neuroverkon opetus Googlen </a:t>
-            </a:r>
-            <a:r>
-              <a:rPr lang="fi-FI" dirty="0" err="1"/>
-              <a:t>colabissa</a:t>
-            </a:r>
-            <a:r>
-              <a:rPr lang="fi-FI" dirty="0"/>
-              <a:t> hyödyntäen koneoppimiskurssin kotitehtävän 7 esimerkkejä.</a:t>
-            </a:r>
-          </a:p>
-          <a:p>
-            <a:pPr marL="457200" indent="-457200">
-              <a:buFont typeface="+mj-lt"/>
-              <a:buAutoNum type="arabicPeriod"/>
-            </a:pPr>
-            <a:r>
-              <a:rPr lang="fi-FI" dirty="0"/>
-              <a:t>Talleta opetetun neuroverkon säätyneet parametrit joko muuttujaan tai tiedostoon ja toteuta pythonilla neuroverkon laskenta siten, että saat saman tuloksen omasta laskelmasta kuin </a:t>
-            </a:r>
-            <a:r>
-              <a:rPr lang="fi-FI" dirty="0" err="1"/>
-              <a:t>model.predict</a:t>
-            </a:r>
-            <a:r>
-              <a:rPr lang="fi-FI" dirty="0"/>
-              <a:t>() funktion avulla. Tämä tehdään siksi, että osataan lopulta toteuttaa neuroverkko Arduinolle C++ kielellä ja tätä python mallia käytetään referenssitoteutuksena. Tämän takia neuroverkon laskenta tulee tehdä pythonin for luuppien avulla eikä käyttäen </a:t>
-            </a:r>
-            <a:r>
-              <a:rPr lang="fi-FI" dirty="0" err="1"/>
-              <a:t>numpyn</a:t>
-            </a:r>
-            <a:r>
-              <a:rPr lang="fi-FI" dirty="0"/>
-              <a:t> </a:t>
-            </a:r>
-            <a:r>
-              <a:rPr lang="fi-FI"/>
-              <a:t>matriisi operaatioiden avulla.</a:t>
-            </a:r>
-            <a:endParaRPr lang="fi-FI" dirty="0"/>
-          </a:p>
-        </p:txBody>
-      </p:sp>
-    </p:spTree>
-    <p:extLst>
-      <p:ext uri="{BB962C8B-B14F-4D97-AF65-F5344CB8AC3E}">
-        <p14:creationId xmlns:p14="http://schemas.microsoft.com/office/powerpoint/2010/main" val="2702633856"/>
       </p:ext>
     </p:extLst>
   </p:cSld>

</xml_diff>